<commit_message>
UG and DG update
</commit_message>
<xml_diff>
--- a/docs/diagrams/DisplayScheduleHighLevelSequenceDiagram.pptx
+++ b/docs/diagrams/DisplayScheduleHighLevelSequenceDiagram.pptx
@@ -208,7 +208,7 @@
           <a:p>
             <a:fld id="{F5CC4B3F-88C1-4FFA-B1B6-F41C21DC6924}" type="datetimeFigureOut">
               <a:rPr lang="en-US" smtClean="0"/>
-              <a:t>4/4/2018</a:t>
+              <a:t>4/6/2018</a:t>
             </a:fld>
             <a:endParaRPr lang="en-US" dirty="0"/>
           </a:p>
@@ -654,7 +654,7 @@
           <a:p>
             <a:fld id="{78C97017-6FC3-485B-9764-EAC9E56C1D49}" type="datetimeFigureOut">
               <a:rPr lang="en-US" smtClean="0"/>
-              <a:t>4/4/2018</a:t>
+              <a:t>4/6/2018</a:t>
             </a:fld>
             <a:endParaRPr lang="en-US" dirty="0"/>
           </a:p>
@@ -822,7 +822,7 @@
           <a:p>
             <a:fld id="{78C97017-6FC3-485B-9764-EAC9E56C1D49}" type="datetimeFigureOut">
               <a:rPr lang="en-US" smtClean="0"/>
-              <a:t>4/4/2018</a:t>
+              <a:t>4/6/2018</a:t>
             </a:fld>
             <a:endParaRPr lang="en-US" dirty="0"/>
           </a:p>
@@ -1000,7 +1000,7 @@
           <a:p>
             <a:fld id="{78C97017-6FC3-485B-9764-EAC9E56C1D49}" type="datetimeFigureOut">
               <a:rPr lang="en-US" smtClean="0"/>
-              <a:t>4/4/2018</a:t>
+              <a:t>4/6/2018</a:t>
             </a:fld>
             <a:endParaRPr lang="en-US" dirty="0"/>
           </a:p>
@@ -1168,7 +1168,7 @@
           <a:p>
             <a:fld id="{78C97017-6FC3-485B-9764-EAC9E56C1D49}" type="datetimeFigureOut">
               <a:rPr lang="en-US" smtClean="0"/>
-              <a:t>4/4/2018</a:t>
+              <a:t>4/6/2018</a:t>
             </a:fld>
             <a:endParaRPr lang="en-US" dirty="0"/>
           </a:p>
@@ -1413,7 +1413,7 @@
           <a:p>
             <a:fld id="{78C97017-6FC3-485B-9764-EAC9E56C1D49}" type="datetimeFigureOut">
               <a:rPr lang="en-US" smtClean="0"/>
-              <a:t>4/4/2018</a:t>
+              <a:t>4/6/2018</a:t>
             </a:fld>
             <a:endParaRPr lang="en-US" dirty="0"/>
           </a:p>
@@ -1698,7 +1698,7 @@
           <a:p>
             <a:fld id="{78C97017-6FC3-485B-9764-EAC9E56C1D49}" type="datetimeFigureOut">
               <a:rPr lang="en-US" smtClean="0"/>
-              <a:t>4/4/2018</a:t>
+              <a:t>4/6/2018</a:t>
             </a:fld>
             <a:endParaRPr lang="en-US" dirty="0"/>
           </a:p>
@@ -2117,7 +2117,7 @@
           <a:p>
             <a:fld id="{78C97017-6FC3-485B-9764-EAC9E56C1D49}" type="datetimeFigureOut">
               <a:rPr lang="en-US" smtClean="0"/>
-              <a:t>4/4/2018</a:t>
+              <a:t>4/6/2018</a:t>
             </a:fld>
             <a:endParaRPr lang="en-US" dirty="0"/>
           </a:p>
@@ -2234,7 +2234,7 @@
           <a:p>
             <a:fld id="{78C97017-6FC3-485B-9764-EAC9E56C1D49}" type="datetimeFigureOut">
               <a:rPr lang="en-US" smtClean="0"/>
-              <a:t>4/4/2018</a:t>
+              <a:t>4/6/2018</a:t>
             </a:fld>
             <a:endParaRPr lang="en-US" dirty="0"/>
           </a:p>
@@ -2329,7 +2329,7 @@
           <a:p>
             <a:fld id="{78C97017-6FC3-485B-9764-EAC9E56C1D49}" type="datetimeFigureOut">
               <a:rPr lang="en-US" smtClean="0"/>
-              <a:t>4/4/2018</a:t>
+              <a:t>4/6/2018</a:t>
             </a:fld>
             <a:endParaRPr lang="en-US" dirty="0"/>
           </a:p>
@@ -2604,7 +2604,7 @@
           <a:p>
             <a:fld id="{78C97017-6FC3-485B-9764-EAC9E56C1D49}" type="datetimeFigureOut">
               <a:rPr lang="en-US" smtClean="0"/>
-              <a:t>4/4/2018</a:t>
+              <a:t>4/6/2018</a:t>
             </a:fld>
             <a:endParaRPr lang="en-US" dirty="0"/>
           </a:p>
@@ -2856,7 +2856,7 @@
           <a:p>
             <a:fld id="{78C97017-6FC3-485B-9764-EAC9E56C1D49}" type="datetimeFigureOut">
               <a:rPr lang="en-US" smtClean="0"/>
-              <a:t>4/4/2018</a:t>
+              <a:t>4/6/2018</a:t>
             </a:fld>
             <a:endParaRPr lang="en-US" dirty="0"/>
           </a:p>
@@ -3067,7 +3067,7 @@
           <a:p>
             <a:fld id="{78C97017-6FC3-485B-9764-EAC9E56C1D49}" type="datetimeFigureOut">
               <a:rPr lang="en-US" smtClean="0"/>
-              <a:t>4/4/2018</a:t>
+              <a:t>4/6/2018</a:t>
             </a:fld>
             <a:endParaRPr lang="en-US" dirty="0"/>
           </a:p>
@@ -5447,12 +5447,142 @@
           </a:p>
         </p:txBody>
       </p:sp>
-      <p:sp>
-        <p:nvSpPr>
-          <p:cNvPr id="52" name="Rectangle 51">
+      <p:cxnSp>
+        <p:nvCxnSpPr>
+          <p:cNvPr id="27" name="Straight Arrow Connector 26">
             <a:extLst>
               <a:ext uri="{FF2B5EF4-FFF2-40B4-BE49-F238E27FC236}">
-                <a16:creationId xmlns:a16="http://schemas.microsoft.com/office/drawing/2014/main" id="{17F8BA55-B8D1-4526-B443-451162675309}"/>
+                <a16:creationId xmlns:a16="http://schemas.microsoft.com/office/drawing/2014/main" id="{8BCAEBD5-720E-492B-BAAB-C68FBC22382C}"/>
+              </a:ext>
+            </a:extLst>
+          </p:cNvPr>
+          <p:cNvCxnSpPr>
+            <a:cxnSpLocks/>
+          </p:cNvCxnSpPr>
+          <p:nvPr/>
+        </p:nvCxnSpPr>
+        <p:spPr>
+          <a:xfrm>
+            <a:off x="3954408" y="2345650"/>
+            <a:ext cx="4591391" cy="0"/>
+          </a:xfrm>
+          <a:prstGeom prst="straightConnector1">
+            <a:avLst/>
+          </a:prstGeom>
+          <a:ln w="19050">
+            <a:tailEnd type="triangle"/>
+          </a:ln>
+        </p:spPr>
+        <p:style>
+          <a:lnRef idx="1">
+            <a:schemeClr val="accent1"/>
+          </a:lnRef>
+          <a:fillRef idx="0">
+            <a:schemeClr val="accent1"/>
+          </a:fillRef>
+          <a:effectRef idx="0">
+            <a:schemeClr val="accent1"/>
+          </a:effectRef>
+          <a:fontRef idx="minor">
+            <a:schemeClr val="tx1"/>
+          </a:fontRef>
+        </p:style>
+      </p:cxnSp>
+      <p:sp>
+        <p:nvSpPr>
+          <p:cNvPr id="59" name="TextBox 58">
+            <a:extLst>
+              <a:ext uri="{FF2B5EF4-FFF2-40B4-BE49-F238E27FC236}">
+                <a16:creationId xmlns:a16="http://schemas.microsoft.com/office/drawing/2014/main" id="{4609F579-953B-456D-88CD-CC90D6B4D24F}"/>
+              </a:ext>
+            </a:extLst>
+          </p:cNvPr>
+          <p:cNvSpPr txBox="1"/>
+          <p:nvPr/>
+        </p:nvSpPr>
+        <p:spPr>
+          <a:xfrm>
+            <a:off x="6020530" y="2132203"/>
+            <a:ext cx="2511058" cy="215444"/>
+          </a:xfrm>
+          <a:prstGeom prst="rect">
+            <a:avLst/>
+          </a:prstGeom>
+          <a:noFill/>
+        </p:spPr>
+        <p:txBody>
+          <a:bodyPr wrap="square" lIns="0" tIns="0" rIns="0" bIns="0" rtlCol="0">
+            <a:spAutoFit/>
+          </a:bodyPr>
+          <a:lstStyle/>
+          <a:p>
+            <a:r>
+              <a:rPr lang="en-US" sz="1400" dirty="0">
+                <a:solidFill>
+                  <a:schemeClr val="accent5">
+                    <a:lumMod val="75000"/>
+                  </a:schemeClr>
+                </a:solidFill>
+              </a:rPr>
+              <a:t>post(ReloadBrowserPanelEvent)</a:t>
+            </a:r>
+          </a:p>
+        </p:txBody>
+      </p:sp>
+      <p:cxnSp>
+        <p:nvCxnSpPr>
+          <p:cNvPr id="61" name="Straight Arrow Connector 60">
+            <a:extLst>
+              <a:ext uri="{FF2B5EF4-FFF2-40B4-BE49-F238E27FC236}">
+                <a16:creationId xmlns:a16="http://schemas.microsoft.com/office/drawing/2014/main" id="{437FE644-CF89-4552-AE29-B6F0980F5FE8}"/>
+              </a:ext>
+            </a:extLst>
+          </p:cNvPr>
+          <p:cNvCxnSpPr>
+            <a:cxnSpLocks/>
+          </p:cNvCxnSpPr>
+          <p:nvPr/>
+        </p:nvCxnSpPr>
+        <p:spPr>
+          <a:xfrm>
+            <a:off x="3954408" y="2500574"/>
+            <a:ext cx="4616068" cy="0"/>
+          </a:xfrm>
+          <a:prstGeom prst="straightConnector1">
+            <a:avLst/>
+          </a:prstGeom>
+          <a:ln w="19050">
+            <a:solidFill>
+              <a:schemeClr val="accent5">
+                <a:lumMod val="75000"/>
+              </a:schemeClr>
+            </a:solidFill>
+            <a:prstDash val="sysDash"/>
+            <a:headEnd type="arrow" w="med" len="med"/>
+            <a:tailEnd type="none" w="med" len="med"/>
+          </a:ln>
+        </p:spPr>
+        <p:style>
+          <a:lnRef idx="1">
+            <a:schemeClr val="accent1"/>
+          </a:lnRef>
+          <a:fillRef idx="0">
+            <a:schemeClr val="accent1"/>
+          </a:fillRef>
+          <a:effectRef idx="0">
+            <a:schemeClr val="accent1"/>
+          </a:effectRef>
+          <a:fontRef idx="minor">
+            <a:schemeClr val="tx1"/>
+          </a:fontRef>
+        </p:style>
+      </p:cxnSp>
+      <p:sp>
+        <p:nvSpPr>
+          <p:cNvPr id="53" name="Rectangle 52">
+            <a:extLst>
+              <a:ext uri="{FF2B5EF4-FFF2-40B4-BE49-F238E27FC236}">
+                <a16:creationId xmlns:a16="http://schemas.microsoft.com/office/drawing/2014/main" id="{25C6544F-EF25-42C1-88EA-89CAF8B8EA79}"/>
               </a:ext>
             </a:extLst>
           </p:cNvPr>
@@ -5461,7 +5591,7 @@
         </p:nvSpPr>
         <p:spPr>
           <a:xfrm>
-            <a:off x="8512430" y="1479370"/>
+            <a:off x="8534400" y="1956813"/>
             <a:ext cx="142006" cy="176787"/>
           </a:xfrm>
           <a:prstGeom prst="rect">
@@ -5508,136 +5638,6 @@
           </a:p>
         </p:txBody>
       </p:sp>
-      <p:cxnSp>
-        <p:nvCxnSpPr>
-          <p:cNvPr id="27" name="Straight Arrow Connector 26">
-            <a:extLst>
-              <a:ext uri="{FF2B5EF4-FFF2-40B4-BE49-F238E27FC236}">
-                <a16:creationId xmlns:a16="http://schemas.microsoft.com/office/drawing/2014/main" id="{8BCAEBD5-720E-492B-BAAB-C68FBC22382C}"/>
-              </a:ext>
-            </a:extLst>
-          </p:cNvPr>
-          <p:cNvCxnSpPr>
-            <a:cxnSpLocks/>
-          </p:cNvCxnSpPr>
-          <p:nvPr/>
-        </p:nvCxnSpPr>
-        <p:spPr>
-          <a:xfrm>
-            <a:off x="3954408" y="2345650"/>
-            <a:ext cx="4591391" cy="0"/>
-          </a:xfrm>
-          <a:prstGeom prst="straightConnector1">
-            <a:avLst/>
-          </a:prstGeom>
-          <a:ln w="19050">
-            <a:tailEnd type="triangle"/>
-          </a:ln>
-        </p:spPr>
-        <p:style>
-          <a:lnRef idx="1">
-            <a:schemeClr val="accent1"/>
-          </a:lnRef>
-          <a:fillRef idx="0">
-            <a:schemeClr val="accent1"/>
-          </a:fillRef>
-          <a:effectRef idx="0">
-            <a:schemeClr val="accent1"/>
-          </a:effectRef>
-          <a:fontRef idx="minor">
-            <a:schemeClr val="tx1"/>
-          </a:fontRef>
-        </p:style>
-      </p:cxnSp>
-      <p:sp>
-        <p:nvSpPr>
-          <p:cNvPr id="59" name="TextBox 58">
-            <a:extLst>
-              <a:ext uri="{FF2B5EF4-FFF2-40B4-BE49-F238E27FC236}">
-                <a16:creationId xmlns:a16="http://schemas.microsoft.com/office/drawing/2014/main" id="{4609F579-953B-456D-88CD-CC90D6B4D24F}"/>
-              </a:ext>
-            </a:extLst>
-          </p:cNvPr>
-          <p:cNvSpPr txBox="1"/>
-          <p:nvPr/>
-        </p:nvSpPr>
-        <p:spPr>
-          <a:xfrm>
-            <a:off x="6020530" y="2132203"/>
-            <a:ext cx="2511058" cy="215444"/>
-          </a:xfrm>
-          <a:prstGeom prst="rect">
-            <a:avLst/>
-          </a:prstGeom>
-          <a:noFill/>
-        </p:spPr>
-        <p:txBody>
-          <a:bodyPr wrap="square" lIns="0" tIns="0" rIns="0" bIns="0" rtlCol="0">
-            <a:spAutoFit/>
-          </a:bodyPr>
-          <a:lstStyle/>
-          <a:p>
-            <a:r>
-              <a:rPr lang="en-US" sz="1400" dirty="0">
-                <a:solidFill>
-                  <a:schemeClr val="accent5">
-                    <a:lumMod val="75000"/>
-                  </a:schemeClr>
-                </a:solidFill>
-              </a:rPr>
-              <a:t>post(ReloadBrowserPanelEvent)</a:t>
-            </a:r>
-          </a:p>
-        </p:txBody>
-      </p:sp>
-      <p:cxnSp>
-        <p:nvCxnSpPr>
-          <p:cNvPr id="61" name="Straight Arrow Connector 60">
-            <a:extLst>
-              <a:ext uri="{FF2B5EF4-FFF2-40B4-BE49-F238E27FC236}">
-                <a16:creationId xmlns:a16="http://schemas.microsoft.com/office/drawing/2014/main" id="{437FE644-CF89-4552-AE29-B6F0980F5FE8}"/>
-              </a:ext>
-            </a:extLst>
-          </p:cNvPr>
-          <p:cNvCxnSpPr>
-            <a:cxnSpLocks/>
-          </p:cNvCxnSpPr>
-          <p:nvPr/>
-        </p:nvCxnSpPr>
-        <p:spPr>
-          <a:xfrm>
-            <a:off x="3954408" y="2500574"/>
-            <a:ext cx="4616068" cy="0"/>
-          </a:xfrm>
-          <a:prstGeom prst="straightConnector1">
-            <a:avLst/>
-          </a:prstGeom>
-          <a:ln w="19050">
-            <a:solidFill>
-              <a:schemeClr val="accent5">
-                <a:lumMod val="75000"/>
-              </a:schemeClr>
-            </a:solidFill>
-            <a:prstDash val="sysDash"/>
-            <a:headEnd type="arrow" w="med" len="med"/>
-            <a:tailEnd type="none" w="med" len="med"/>
-          </a:ln>
-        </p:spPr>
-        <p:style>
-          <a:lnRef idx="1">
-            <a:schemeClr val="accent1"/>
-          </a:lnRef>
-          <a:fillRef idx="0">
-            <a:schemeClr val="accent1"/>
-          </a:fillRef>
-          <a:effectRef idx="0">
-            <a:schemeClr val="accent1"/>
-          </a:effectRef>
-          <a:fontRef idx="minor">
-            <a:schemeClr val="tx1"/>
-          </a:fontRef>
-        </p:style>
-      </p:cxnSp>
     </p:spTree>
     <p:extLst>
       <p:ext uri="{BB962C8B-B14F-4D97-AF65-F5344CB8AC3E}">

</xml_diff>